<commit_message>
* changed a word
</commit_message>
<xml_diff>
--- a/03 Woche.pptx
+++ b/03 Woche.pptx
@@ -121,7 +121,7 @@
   </p:defaultTextStyle>
   <p:extLst>
     <p:ext uri="{EFAFB233-063F-42B5-8137-9DF3F51BA10A}">
-      <p15:sldGuideLst xmlns="" xmlns:p15="http://schemas.microsoft.com/office/powerpoint/2012/main">
+      <p15:sldGuideLst xmlns:p15="http://schemas.microsoft.com/office/powerpoint/2012/main" xmlns="">
         <p15:guide id="1" orient="horz" pos="781">
           <p15:clr>
             <a:srgbClr val="A4A3A4"/>
@@ -210,7 +210,7 @@
       </p15:sldGuideLst>
     </p:ext>
     <p:ext uri="{2D200454-40CA-4A62-9FC3-DE9A4176ACB9}">
-      <p15:notesGuideLst xmlns="" xmlns:p15="http://schemas.microsoft.com/office/powerpoint/2012/main">
+      <p15:notesGuideLst xmlns:p15="http://schemas.microsoft.com/office/powerpoint/2012/main" xmlns="">
         <p15:guide id="1" orient="horz" pos="2676">
           <p15:clr>
             <a:srgbClr val="A4A3A4"/>
@@ -11665,8 +11665,8 @@
           <a:lstStyle/>
           <a:p>
             <a:r>
-              <a:rPr lang="de-DE" dirty="0" smtClean="0"/>
-              <a:t>TODOs von letztem Mal</a:t>
+              <a:rPr lang="de-DE" smtClean="0"/>
+              <a:t>Grober Ablauf</a:t>
             </a:r>
             <a:endParaRPr lang="de-DE" dirty="0"/>
           </a:p>
@@ -11731,11 +11731,7 @@
           <a:p>
             <a:r>
               <a:rPr lang="en-US" dirty="0" smtClean="0"/>
-              <a:t>Installation </a:t>
-            </a:r>
-            <a:r>
-              <a:rPr lang="en-US" dirty="0" smtClean="0"/>
-              <a:t>von </a:t>
+              <a:t>Installation von </a:t>
             </a:r>
             <a:r>
               <a:rPr lang="en-US" dirty="0" err="1" smtClean="0"/>
@@ -13117,7 +13113,7 @@
   <a:extraClrSchemeLst/>
   <a:extLst>
     <a:ext uri="{05A4C25C-085E-4340-85A3-A5531E510DB2}">
-      <thm15:themeFamily xmlns="" xmlns:thm15="http://schemas.microsoft.com/office/thememl/2012/main" name="TEMPLATE_HPI_05_EXP" id="{EEEEA749-3836-4DC6-BA52-AE8D0ADE122A}" vid="{1AF48529-3759-4302-91D0-708D448B88CB}"/>
+      <thm15:themeFamily xmlns:thm15="http://schemas.microsoft.com/office/thememl/2012/main" xmlns="" name="TEMPLATE_HPI_05_EXP" id="{EEEEA749-3836-4DC6-BA52-AE8D0ADE122A}" vid="{1AF48529-3759-4302-91D0-708D448B88CB}"/>
     </a:ext>
   </a:extLst>
 </a:theme>

</xml_diff>